<commit_message>
refactor(shape): separate cleanup helper; improve visual type recognition
</commit_message>
<xml_diff>
--- a/__tests__/pptx-templates/ShapeTypesCollection.pptx
+++ b/__tests__/pptx-templates/ShapeTypesCollection.pptx
@@ -4350,7 +4350,7 @@
           <a:p>
             <a:fld id="{8FB60A0F-5ED1-45ED-A5D5-DB038E6B70D9}" type="datetimeFigureOut">
               <a:rPr lang="de-DE" smtClean="0"/>
-              <a:t>16.10.2025</a:t>
+              <a:t>18.10.2025</a:t>
             </a:fld>
             <a:endParaRPr lang="de-DE"/>
           </a:p>
@@ -4548,7 +4548,7 @@
           <a:p>
             <a:fld id="{8FB60A0F-5ED1-45ED-A5D5-DB038E6B70D9}" type="datetimeFigureOut">
               <a:rPr lang="de-DE" smtClean="0"/>
-              <a:t>16.10.2025</a:t>
+              <a:t>18.10.2025</a:t>
             </a:fld>
             <a:endParaRPr lang="de-DE"/>
           </a:p>
@@ -4756,7 +4756,7 @@
           <a:p>
             <a:fld id="{8FB60A0F-5ED1-45ED-A5D5-DB038E6B70D9}" type="datetimeFigureOut">
               <a:rPr lang="de-DE" smtClean="0"/>
-              <a:t>16.10.2025</a:t>
+              <a:t>18.10.2025</a:t>
             </a:fld>
             <a:endParaRPr lang="de-DE"/>
           </a:p>
@@ -4954,7 +4954,7 @@
           <a:p>
             <a:fld id="{8FB60A0F-5ED1-45ED-A5D5-DB038E6B70D9}" type="datetimeFigureOut">
               <a:rPr lang="de-DE" smtClean="0"/>
-              <a:t>16.10.2025</a:t>
+              <a:t>18.10.2025</a:t>
             </a:fld>
             <a:endParaRPr lang="de-DE"/>
           </a:p>
@@ -5229,7 +5229,7 @@
           <a:p>
             <a:fld id="{8FB60A0F-5ED1-45ED-A5D5-DB038E6B70D9}" type="datetimeFigureOut">
               <a:rPr lang="de-DE" smtClean="0"/>
-              <a:t>16.10.2025</a:t>
+              <a:t>18.10.2025</a:t>
             </a:fld>
             <a:endParaRPr lang="de-DE"/>
           </a:p>
@@ -5494,7 +5494,7 @@
           <a:p>
             <a:fld id="{8FB60A0F-5ED1-45ED-A5D5-DB038E6B70D9}" type="datetimeFigureOut">
               <a:rPr lang="de-DE" smtClean="0"/>
-              <a:t>16.10.2025</a:t>
+              <a:t>18.10.2025</a:t>
             </a:fld>
             <a:endParaRPr lang="de-DE"/>
           </a:p>
@@ -5906,7 +5906,7 @@
           <a:p>
             <a:fld id="{8FB60A0F-5ED1-45ED-A5D5-DB038E6B70D9}" type="datetimeFigureOut">
               <a:rPr lang="de-DE" smtClean="0"/>
-              <a:t>16.10.2025</a:t>
+              <a:t>18.10.2025</a:t>
             </a:fld>
             <a:endParaRPr lang="de-DE"/>
           </a:p>
@@ -6047,7 +6047,7 @@
           <a:p>
             <a:fld id="{8FB60A0F-5ED1-45ED-A5D5-DB038E6B70D9}" type="datetimeFigureOut">
               <a:rPr lang="de-DE" smtClean="0"/>
-              <a:t>16.10.2025</a:t>
+              <a:t>18.10.2025</a:t>
             </a:fld>
             <a:endParaRPr lang="de-DE"/>
           </a:p>
@@ -6160,7 +6160,7 @@
           <a:p>
             <a:fld id="{8FB60A0F-5ED1-45ED-A5D5-DB038E6B70D9}" type="datetimeFigureOut">
               <a:rPr lang="de-DE" smtClean="0"/>
-              <a:t>16.10.2025</a:t>
+              <a:t>18.10.2025</a:t>
             </a:fld>
             <a:endParaRPr lang="de-DE"/>
           </a:p>
@@ -6471,7 +6471,7 @@
           <a:p>
             <a:fld id="{8FB60A0F-5ED1-45ED-A5D5-DB038E6B70D9}" type="datetimeFigureOut">
               <a:rPr lang="de-DE" smtClean="0"/>
-              <a:t>16.10.2025</a:t>
+              <a:t>18.10.2025</a:t>
             </a:fld>
             <a:endParaRPr lang="de-DE"/>
           </a:p>
@@ -6759,7 +6759,7 @@
           <a:p>
             <a:fld id="{8FB60A0F-5ED1-45ED-A5D5-DB038E6B70D9}" type="datetimeFigureOut">
               <a:rPr lang="de-DE" smtClean="0"/>
-              <a:t>16.10.2025</a:t>
+              <a:t>18.10.2025</a:t>
             </a:fld>
             <a:endParaRPr lang="de-DE"/>
           </a:p>
@@ -7000,7 +7000,7 @@
           <a:p>
             <a:fld id="{8FB60A0F-5ED1-45ED-A5D5-DB038E6B70D9}" type="datetimeFigureOut">
               <a:rPr lang="de-DE" smtClean="0"/>
-              <a:t>16.10.2025</a:t>
+              <a:t>18.10.2025</a:t>
             </a:fld>
             <a:endParaRPr lang="de-DE"/>
           </a:p>
@@ -7865,6 +7865,157 @@
           </a:prstGeom>
         </p:spPr>
       </p:pic>
+      <p:sp>
+        <p:nvSpPr>
+          <p:cNvPr id="3" name="VecorShape (Rectangle)">
+            <a:extLst>
+              <a:ext uri="{FF2B5EF4-FFF2-40B4-BE49-F238E27FC236}">
+                <a16:creationId xmlns:a16="http://schemas.microsoft.com/office/drawing/2014/main" id="{800B49E8-E6BB-4E84-B91D-A2A9CF7E2694}"/>
+              </a:ext>
+            </a:extLst>
+          </p:cNvPr>
+          <p:cNvSpPr/>
+          <p:nvPr/>
+        </p:nvSpPr>
+        <p:spPr>
+          <a:xfrm>
+            <a:off x="8135815" y="4296508"/>
+            <a:ext cx="1234831" cy="871604"/>
+          </a:xfrm>
+          <a:prstGeom prst="rect">
+            <a:avLst/>
+          </a:prstGeom>
+        </p:spPr>
+        <p:style>
+          <a:lnRef idx="2">
+            <a:schemeClr val="accent1">
+              <a:shade val="50000"/>
+            </a:schemeClr>
+          </a:lnRef>
+          <a:fillRef idx="1">
+            <a:schemeClr val="accent1"/>
+          </a:fillRef>
+          <a:effectRef idx="0">
+            <a:schemeClr val="accent1"/>
+          </a:effectRef>
+          <a:fontRef idx="minor">
+            <a:schemeClr val="lt1"/>
+          </a:fontRef>
+        </p:style>
+        <p:txBody>
+          <a:bodyPr rtlCol="0" anchor="ctr"/>
+          <a:lstStyle/>
+          <a:p>
+            <a:pPr algn="ctr"/>
+            <a:r>
+              <a:rPr lang="de-DE" dirty="0"/>
+              <a:t>Test</a:t>
+            </a:r>
+          </a:p>
+        </p:txBody>
+      </p:sp>
+      <p:sp>
+        <p:nvSpPr>
+          <p:cNvPr id="5" name="Textfield (Native)">
+            <a:extLst>
+              <a:ext uri="{FF2B5EF4-FFF2-40B4-BE49-F238E27FC236}">
+                <a16:creationId xmlns:a16="http://schemas.microsoft.com/office/drawing/2014/main" id="{49045C83-3F0D-4F6A-ADE4-5BAA44F416CD}"/>
+              </a:ext>
+            </a:extLst>
+          </p:cNvPr>
+          <p:cNvSpPr txBox="1"/>
+          <p:nvPr/>
+        </p:nvSpPr>
+        <p:spPr>
+          <a:xfrm>
+            <a:off x="4226573" y="5168112"/>
+            <a:ext cx="2740284" cy="369332"/>
+          </a:xfrm>
+          <a:prstGeom prst="rect">
+            <a:avLst/>
+          </a:prstGeom>
+          <a:noFill/>
+        </p:spPr>
+        <p:txBody>
+          <a:bodyPr wrap="square" rtlCol="0">
+            <a:spAutoFit/>
+          </a:bodyPr>
+          <a:lstStyle/>
+          <a:p>
+            <a:r>
+              <a:rPr lang="de-DE" dirty="0"/>
+              <a:t>Native </a:t>
+            </a:r>
+            <a:r>
+              <a:rPr lang="de-DE" dirty="0" err="1"/>
+              <a:t>Textfield</a:t>
+            </a:r>
+            <a:endParaRPr lang="de-DE" dirty="0"/>
+          </a:p>
+        </p:txBody>
+      </p:sp>
+      <p:sp>
+        <p:nvSpPr>
+          <p:cNvPr id="14" name="Image filled rectangle">
+            <a:extLst>
+              <a:ext uri="{FF2B5EF4-FFF2-40B4-BE49-F238E27FC236}">
+                <a16:creationId xmlns:a16="http://schemas.microsoft.com/office/drawing/2014/main" id="{51FCAF1C-DA7B-40E6-ADE7-71C339148CF1}"/>
+              </a:ext>
+            </a:extLst>
+          </p:cNvPr>
+          <p:cNvSpPr/>
+          <p:nvPr/>
+        </p:nvSpPr>
+        <p:spPr>
+          <a:xfrm>
+            <a:off x="960238" y="5067760"/>
+            <a:ext cx="1861116" cy="1086297"/>
+          </a:xfrm>
+          <a:prstGeom prst="rect">
+            <a:avLst/>
+          </a:prstGeom>
+          <a:blipFill dpi="0" rotWithShape="1">
+            <a:blip r:embed="rId13">
+              <a:extLst>
+                <a:ext uri="{28A0092B-C50C-407E-A947-70E740481C1C}">
+                  <a14:useLocalDpi xmlns:a14="http://schemas.microsoft.com/office/drawing/2010/main" val="0"/>
+                </a:ext>
+                <a:ext uri="{96DAC541-7B7A-43D3-8B79-37D633B846F1}">
+                  <asvg:svgBlip xmlns:asvg="http://schemas.microsoft.com/office/drawing/2016/SVG/main" r:embed="rId14"/>
+                </a:ext>
+              </a:extLst>
+            </a:blip>
+            <a:srcRect/>
+            <a:stretch>
+              <a:fillRect/>
+            </a:stretch>
+          </a:blipFill>
+        </p:spPr>
+        <p:style>
+          <a:lnRef idx="2">
+            <a:schemeClr val="accent1">
+              <a:shade val="50000"/>
+            </a:schemeClr>
+          </a:lnRef>
+          <a:fillRef idx="1">
+            <a:schemeClr val="accent1"/>
+          </a:fillRef>
+          <a:effectRef idx="0">
+            <a:schemeClr val="accent1"/>
+          </a:effectRef>
+          <a:fontRef idx="minor">
+            <a:schemeClr val="lt1"/>
+          </a:fontRef>
+        </p:style>
+        <p:txBody>
+          <a:bodyPr rtlCol="0" anchor="ctr"/>
+          <a:lstStyle/>
+          <a:p>
+            <a:pPr algn="ctr"/>
+            <a:endParaRPr lang="de-DE" dirty="0"/>
+          </a:p>
+        </p:txBody>
+      </p:sp>
     </p:spTree>
     <p:extLst>
       <p:ext uri="{BB962C8B-B14F-4D97-AF65-F5344CB8AC3E}">

</xml_diff>